<commit_message>
Narrated the first two slides of the final presentation
</commit_message>
<xml_diff>
--- a/Team Deliverable 4/Final Project - FHIRed Up.pptx
+++ b/Team Deliverable 4/Final Project - FHIRed Up.pptx
@@ -5,20 +5,21 @@
     <p:sldMasterId id="2147483684" r:id="rId1"/>
   </p:sldMasterIdLst>
   <p:notesMasterIdLst>
-    <p:notesMasterId r:id="rId13"/>
+    <p:notesMasterId r:id="rId14"/>
   </p:notesMasterIdLst>
   <p:sldIdLst>
     <p:sldId id="256" r:id="rId2"/>
     <p:sldId id="295" r:id="rId3"/>
-    <p:sldId id="276" r:id="rId4"/>
-    <p:sldId id="289" r:id="rId5"/>
-    <p:sldId id="290" r:id="rId6"/>
-    <p:sldId id="291" r:id="rId7"/>
-    <p:sldId id="292" r:id="rId8"/>
-    <p:sldId id="293" r:id="rId9"/>
-    <p:sldId id="286" r:id="rId10"/>
-    <p:sldId id="288" r:id="rId11"/>
-    <p:sldId id="294" r:id="rId12"/>
+    <p:sldId id="296" r:id="rId4"/>
+    <p:sldId id="276" r:id="rId5"/>
+    <p:sldId id="289" r:id="rId6"/>
+    <p:sldId id="290" r:id="rId7"/>
+    <p:sldId id="291" r:id="rId8"/>
+    <p:sldId id="292" r:id="rId9"/>
+    <p:sldId id="293" r:id="rId10"/>
+    <p:sldId id="286" r:id="rId11"/>
+    <p:sldId id="288" r:id="rId12"/>
+    <p:sldId id="294" r:id="rId13"/>
   </p:sldIdLst>
   <p:sldSz cx="9144000" cy="5715000" type="screen16x10"/>
   <p:notesSz cx="6858000" cy="9144000"/>
@@ -119,7 +120,7 @@
   </p:defaultTextStyle>
   <p:extLst>
     <p:ext uri="{EFAFB233-063F-42B5-8137-9DF3F51BA10A}">
-      <p15:sldGuideLst xmlns="" xmlns:p15="http://schemas.microsoft.com/office/powerpoint/2012/main">
+      <p15:sldGuideLst xmlns:p15="http://schemas.microsoft.com/office/powerpoint/2012/main">
         <p15:guide id="1" orient="horz" pos="1800" userDrawn="1">
           <p15:clr>
             <a:srgbClr val="A4A3A4"/>
@@ -133,7 +134,7 @@
       </p15:sldGuideLst>
     </p:ext>
     <p:ext uri="{2D200454-40CA-4A62-9FC3-DE9A4176ACB9}">
-      <p15:notesGuideLst xmlns="" xmlns:p15="http://schemas.microsoft.com/office/powerpoint/2012/main"/>
+      <p15:notesGuideLst xmlns:p15="http://schemas.microsoft.com/office/powerpoint/2012/main"/>
     </p:ext>
   </p:extLst>
 </p:presentation>
@@ -227,7 +228,7 @@
           <a:p>
             <a:fld id="{82AF1EC4-0AE9-4ABA-827F-84879B727577}" type="datetimeFigureOut">
               <a:rPr lang="en-US" smtClean="0"/>
-              <a:t>4/7/2016</a:t>
+              <a:t>4/18/2016</a:t>
             </a:fld>
             <a:endParaRPr lang="en-US"/>
           </a:p>
@@ -539,6 +540,18 @@
           <a:bodyPr/>
           <a:lstStyle/>
           <a:p>
+            <a:r>
+              <a:rPr lang="en-US" dirty="0" smtClean="0"/>
+              <a:t>This presentation describes RADV, the Risk Adjustment Data Validation tool developed by team </a:t>
+            </a:r>
+            <a:r>
+              <a:rPr lang="en-US" dirty="0" err="1" smtClean="0"/>
+              <a:t>FHIRed</a:t>
+            </a:r>
+            <a:r>
+              <a:rPr lang="en-US" dirty="0" smtClean="0"/>
+              <a:t> Up.</a:t>
+            </a:r>
             <a:endParaRPr lang="en-US" dirty="0"/>
           </a:p>
         </p:txBody>
@@ -623,7 +636,52 @@
           <a:bodyPr/>
           <a:lstStyle/>
           <a:p>
-            <a:endParaRPr lang="en-US" dirty="0" smtClean="0"/>
+            <a:pPr defTabSz="931774">
+              <a:defRPr/>
+            </a:pPr>
+            <a:r>
+              <a:rPr lang="en-US" sz="900" dirty="0" smtClean="0"/>
+              <a:t>The Affordable Care Act requires health insurance</a:t>
+            </a:r>
+            <a:r>
+              <a:rPr lang="en-US" sz="900" baseline="0" dirty="0" smtClean="0"/>
+              <a:t> companies to offer insurance to people with pre-existing conditions.  By only offering policies with high co-pays and high-deductibles, insurance companies can discourage ill patients from purchasing their products.  Risk adjustment prevents this by transferring premiums from insurers with healthy members to those organizations that are insuring for a more ill population.</a:t>
+            </a:r>
+          </a:p>
+          <a:p>
+            <a:pPr defTabSz="931774">
+              <a:defRPr/>
+            </a:pPr>
+            <a:endParaRPr lang="en-US" sz="900" dirty="0" smtClean="0"/>
+          </a:p>
+          <a:p>
+            <a:pPr defTabSz="931774">
+              <a:defRPr/>
+            </a:pPr>
+            <a:r>
+              <a:rPr lang="en-US" sz="900" dirty="0" smtClean="0"/>
+              <a:t>Risk</a:t>
+            </a:r>
+            <a:r>
+              <a:rPr lang="en-US" sz="900" baseline="0" dirty="0" smtClean="0"/>
+              <a:t> scores are use to determine the average level of illness in an insurers population. A risk score is calculated using the list of diagnoses recorded for a patient during the previous calendar year.  This gives providers and insurers a strong financial interest in making medical records accurate and complete.</a:t>
+            </a:r>
+          </a:p>
+          <a:p>
+            <a:pPr defTabSz="931774">
+              <a:defRPr/>
+            </a:pPr>
+            <a:endParaRPr lang="en-US" sz="900" baseline="0" dirty="0" smtClean="0"/>
+          </a:p>
+          <a:p>
+            <a:pPr defTabSz="931774">
+              <a:defRPr/>
+            </a:pPr>
+            <a:r>
+              <a:rPr lang="en-US" sz="900" baseline="0" dirty="0" smtClean="0"/>
+              <a:t>The RADV tool was designed to help providers validate medical records, by identifying health care conditions that may be missing from a patients recent medical record.</a:t>
+            </a:r>
+            <a:endParaRPr lang="en-US" sz="900" dirty="0"/>
           </a:p>
         </p:txBody>
       </p:sp>
@@ -644,7 +702,7 @@
           <a:p>
             <a:fld id="{64DBF1C4-A8A4-46A4-960B-68980B6D50C1}" type="slidenum">
               <a:rPr lang="en-US" smtClean="0"/>
-              <a:t>3</a:t>
+              <a:t>2</a:t>
             </a:fld>
             <a:endParaRPr lang="en-US"/>
           </a:p>
@@ -653,7 +711,7 @@
     </p:spTree>
     <p:extLst>
       <p:ext uri="{BB962C8B-B14F-4D97-AF65-F5344CB8AC3E}">
-        <p14:creationId xmlns:p14="http://schemas.microsoft.com/office/powerpoint/2010/main" val="60343986"/>
+        <p14:creationId xmlns:p14="http://schemas.microsoft.com/office/powerpoint/2010/main" val="960926333"/>
       </p:ext>
     </p:extLst>
   </p:cSld>
@@ -737,7 +795,7 @@
     </p:spTree>
     <p:extLst>
       <p:ext uri="{BB962C8B-B14F-4D97-AF65-F5344CB8AC3E}">
-        <p14:creationId xmlns:p14="http://schemas.microsoft.com/office/powerpoint/2010/main" val="1617621388"/>
+        <p14:creationId xmlns:p14="http://schemas.microsoft.com/office/powerpoint/2010/main" val="60343986"/>
       </p:ext>
     </p:extLst>
   </p:cSld>
@@ -791,7 +849,7 @@
           <a:bodyPr/>
           <a:lstStyle/>
           <a:p>
-            <a:endParaRPr lang="en-US" dirty="0"/>
+            <a:endParaRPr lang="en-US" dirty="0" smtClean="0"/>
           </a:p>
         </p:txBody>
       </p:sp>
@@ -812,7 +870,7 @@
           <a:p>
             <a:fld id="{64DBF1C4-A8A4-46A4-960B-68980B6D50C1}" type="slidenum">
               <a:rPr lang="en-US" smtClean="0"/>
-              <a:t>9</a:t>
+              <a:t>5</a:t>
             </a:fld>
             <a:endParaRPr lang="en-US"/>
           </a:p>
@@ -821,7 +879,7 @@
     </p:spTree>
     <p:extLst>
       <p:ext uri="{BB962C8B-B14F-4D97-AF65-F5344CB8AC3E}">
-        <p14:creationId xmlns:p14="http://schemas.microsoft.com/office/powerpoint/2010/main" val="925080687"/>
+        <p14:creationId xmlns:p14="http://schemas.microsoft.com/office/powerpoint/2010/main" val="1617621388"/>
       </p:ext>
     </p:extLst>
   </p:cSld>
@@ -875,6 +933,90 @@
           <a:bodyPr/>
           <a:lstStyle/>
           <a:p>
+            <a:endParaRPr lang="en-US" dirty="0"/>
+          </a:p>
+        </p:txBody>
+      </p:sp>
+      <p:sp>
+        <p:nvSpPr>
+          <p:cNvPr id="4" name="Slide Number Placeholder 3"/>
+          <p:cNvSpPr>
+            <a:spLocks noGrp="1"/>
+          </p:cNvSpPr>
+          <p:nvPr>
+            <p:ph type="sldNum" sz="quarter" idx="10"/>
+          </p:nvPr>
+        </p:nvSpPr>
+        <p:spPr/>
+        <p:txBody>
+          <a:bodyPr/>
+          <a:lstStyle/>
+          <a:p>
+            <a:fld id="{64DBF1C4-A8A4-46A4-960B-68980B6D50C1}" type="slidenum">
+              <a:rPr lang="en-US" smtClean="0"/>
+              <a:t>10</a:t>
+            </a:fld>
+            <a:endParaRPr lang="en-US"/>
+          </a:p>
+        </p:txBody>
+      </p:sp>
+    </p:spTree>
+    <p:extLst>
+      <p:ext uri="{BB962C8B-B14F-4D97-AF65-F5344CB8AC3E}">
+        <p14:creationId xmlns:p14="http://schemas.microsoft.com/office/powerpoint/2010/main" val="925080687"/>
+      </p:ext>
+    </p:extLst>
+  </p:cSld>
+  <p:clrMapOvr>
+    <a:masterClrMapping/>
+  </p:clrMapOvr>
+</p:notes>
+</file>
+
+<file path=ppt/notesSlides/notesSlide6.xml><?xml version="1.0" encoding="utf-8"?>
+<p:notes xmlns:a="http://schemas.openxmlformats.org/drawingml/2006/main" xmlns:r="http://schemas.openxmlformats.org/officeDocument/2006/relationships" xmlns:p="http://schemas.openxmlformats.org/presentationml/2006/main">
+  <p:cSld>
+    <p:spTree>
+      <p:nvGrpSpPr>
+        <p:cNvPr id="1" name=""/>
+        <p:cNvGrpSpPr/>
+        <p:nvPr/>
+      </p:nvGrpSpPr>
+      <p:grpSpPr>
+        <a:xfrm>
+          <a:off x="0" y="0"/>
+          <a:ext cx="0" cy="0"/>
+          <a:chOff x="0" y="0"/>
+          <a:chExt cx="0" cy="0"/>
+        </a:xfrm>
+      </p:grpSpPr>
+      <p:sp>
+        <p:nvSpPr>
+          <p:cNvPr id="2" name="Slide Image Placeholder 1"/>
+          <p:cNvSpPr>
+            <a:spLocks noGrp="1" noRot="1" noChangeAspect="1"/>
+          </p:cNvSpPr>
+          <p:nvPr>
+            <p:ph type="sldImg"/>
+          </p:nvPr>
+        </p:nvSpPr>
+        <p:spPr/>
+      </p:sp>
+      <p:sp>
+        <p:nvSpPr>
+          <p:cNvPr id="3" name="Notes Placeholder 2"/>
+          <p:cNvSpPr>
+            <a:spLocks noGrp="1"/>
+          </p:cNvSpPr>
+          <p:nvPr>
+            <p:ph type="body" idx="1"/>
+          </p:nvPr>
+        </p:nvSpPr>
+        <p:spPr/>
+        <p:txBody>
+          <a:bodyPr/>
+          <a:lstStyle/>
+          <a:p>
             <a:r>
               <a:rPr lang="en-US" dirty="0" smtClean="0"/>
               <a:t>This final slide shows</a:t>
@@ -904,7 +1046,7 @@
           <a:p>
             <a:fld id="{64DBF1C4-A8A4-46A4-960B-68980B6D50C1}" type="slidenum">
               <a:rPr lang="en-US" smtClean="0"/>
-              <a:t>10</a:t>
+              <a:t>11</a:t>
             </a:fld>
             <a:endParaRPr lang="en-US"/>
           </a:p>
@@ -1117,7 +1259,7 @@
           <a:p>
             <a:fld id="{3EAEFB75-4DE4-4DFC-B956-52D01254B927}" type="datetimeFigureOut">
               <a:rPr lang="en-US" smtClean="0"/>
-              <a:t>4/7/2016</a:t>
+              <a:t>4/18/2016</a:t>
             </a:fld>
             <a:endParaRPr lang="en-US"/>
           </a:p>
@@ -1470,7 +1612,7 @@
           <a:p>
             <a:fld id="{3EAEFB75-4DE4-4DFC-B956-52D01254B927}" type="datetimeFigureOut">
               <a:rPr lang="en-US" smtClean="0"/>
-              <a:t>4/7/2016</a:t>
+              <a:t>4/18/2016</a:t>
             </a:fld>
             <a:endParaRPr lang="en-US"/>
           </a:p>
@@ -1645,7 +1787,7 @@
           <a:p>
             <a:fld id="{3EAEFB75-4DE4-4DFC-B956-52D01254B927}" type="datetimeFigureOut">
               <a:rPr lang="en-US" smtClean="0"/>
-              <a:t>4/7/2016</a:t>
+              <a:t>4/18/2016</a:t>
             </a:fld>
             <a:endParaRPr lang="en-US"/>
           </a:p>
@@ -1758,7 +1900,7 @@
           <a:p>
             <a:fld id="{3EAEFB75-4DE4-4DFC-B956-52D01254B927}" type="datetimeFigureOut">
               <a:rPr lang="en-US" smtClean="0"/>
-              <a:t>4/7/2016</a:t>
+              <a:t>4/18/2016</a:t>
             </a:fld>
             <a:endParaRPr lang="en-US"/>
           </a:p>
@@ -2116,7 +2258,7 @@
           <a:p>
             <a:fld id="{3EAEFB75-4DE4-4DFC-B956-52D01254B927}" type="datetimeFigureOut">
               <a:rPr lang="en-US" smtClean="0"/>
-              <a:t>4/7/2016</a:t>
+              <a:t>4/18/2016</a:t>
             </a:fld>
             <a:endParaRPr lang="en-US"/>
           </a:p>
@@ -2381,7 +2523,7 @@
           <a:p>
             <a:fld id="{3EAEFB75-4DE4-4DFC-B956-52D01254B927}" type="datetimeFigureOut">
               <a:rPr lang="en-US" smtClean="0"/>
-              <a:t>4/7/2016</a:t>
+              <a:t>4/18/2016</a:t>
             </a:fld>
             <a:endParaRPr lang="en-US"/>
           </a:p>
@@ -2743,7 +2885,7 @@
           <a:p>
             <a:fld id="{3EAEFB75-4DE4-4DFC-B956-52D01254B927}" type="datetimeFigureOut">
               <a:rPr lang="en-US" smtClean="0"/>
-              <a:t>4/7/2016</a:t>
+              <a:t>4/18/2016</a:t>
             </a:fld>
             <a:endParaRPr lang="en-US"/>
           </a:p>
@@ -2970,7 +3112,7 @@
           <a:p>
             <a:fld id="{3EAEFB75-4DE4-4DFC-B956-52D01254B927}" type="datetimeFigureOut">
               <a:rPr lang="en-US" smtClean="0"/>
-              <a:t>4/7/2016</a:t>
+              <a:t>4/18/2016</a:t>
             </a:fld>
             <a:endParaRPr lang="en-US"/>
           </a:p>
@@ -3060,7 +3202,7 @@
           <a:p>
             <a:fld id="{3EAEFB75-4DE4-4DFC-B956-52D01254B927}" type="datetimeFigureOut">
               <a:rPr lang="en-US" smtClean="0"/>
-              <a:t>4/7/2016</a:t>
+              <a:t>4/18/2016</a:t>
             </a:fld>
             <a:endParaRPr lang="en-US"/>
           </a:p>
@@ -3327,7 +3469,7 @@
           <a:p>
             <a:fld id="{3EAEFB75-4DE4-4DFC-B956-52D01254B927}" type="datetimeFigureOut">
               <a:rPr lang="en-US" smtClean="0"/>
-              <a:t>4/7/2016</a:t>
+              <a:t>4/18/2016</a:t>
             </a:fld>
             <a:endParaRPr lang="en-US"/>
           </a:p>
@@ -3555,7 +3697,7 @@
           <a:p>
             <a:fld id="{3EAEFB75-4DE4-4DFC-B956-52D01254B927}" type="datetimeFigureOut">
               <a:rPr lang="en-US" smtClean="0"/>
-              <a:t>4/7/2016</a:t>
+              <a:t>4/18/2016</a:t>
             </a:fld>
             <a:endParaRPr lang="en-US"/>
           </a:p>
@@ -4054,7 +4196,7 @@
           <a:p>
             <a:fld id="{3EAEFB75-4DE4-4DFC-B956-52D01254B927}" type="datetimeFigureOut">
               <a:rPr lang="en-US" smtClean="0"/>
-              <a:t>4/7/2016</a:t>
+              <a:t>4/18/2016</a:t>
             </a:fld>
             <a:endParaRPr lang="en-US"/>
           </a:p>
@@ -4500,7 +4642,7 @@
             </a:r>
             <a:r>
               <a:rPr lang="en-US" dirty="0" smtClean="0">
-                <a:hlinkClick r:id="rId3"/>
+                <a:hlinkClick r:id="rId5"/>
               </a:rPr>
               <a:t>aburgos3@gatech.edu</a:t>
             </a:r>
@@ -4521,7 +4663,7 @@
             </a:r>
             <a:r>
               <a:rPr lang="en-US" dirty="0" smtClean="0">
-                <a:hlinkClick r:id="rId4"/>
+                <a:hlinkClick r:id="rId6"/>
               </a:rPr>
               <a:t>spiroganas@gmail.com</a:t>
             </a:r>
@@ -4542,7 +4684,7 @@
             </a:r>
             <a:r>
               <a:rPr lang="en-US" dirty="0" smtClean="0">
-                <a:hlinkClick r:id="rId5"/>
+                <a:hlinkClick r:id="rId7"/>
               </a:rPr>
               <a:t>anjag1993@gmail.com</a:t>
             </a:r>
@@ -4567,7 +4709,7 @@
             </a:r>
             <a:r>
               <a:rPr lang="en-US" dirty="0" smtClean="0">
-                <a:hlinkClick r:id="rId6"/>
+                <a:hlinkClick r:id="rId8"/>
               </a:rPr>
               <a:t>jrichgels3@gatech.edu</a:t>
             </a:r>
@@ -4592,7 +4734,7 @@
             </a:r>
             <a:r>
               <a:rPr lang="en-US" dirty="0" smtClean="0">
-                <a:hlinkClick r:id="rId7"/>
+                <a:hlinkClick r:id="rId9"/>
               </a:rPr>
               <a:t>dstoneburner3@gatech.edu</a:t>
             </a:r>
@@ -4617,7 +4759,7 @@
             </a:r>
             <a:r>
               <a:rPr lang="en-US" dirty="0" smtClean="0">
-                <a:hlinkClick r:id="rId8"/>
+                <a:hlinkClick r:id="rId10"/>
               </a:rPr>
               <a:t>tmsuidan@gatech.edu</a:t>
             </a:r>
@@ -4669,6 +4811,39 @@
           </a:p>
         </p:txBody>
       </p:sp>
+      <p:pic>
+        <p:nvPicPr>
+          <p:cNvPr id="4" name="Audio 3">
+            <a:hlinkClick r:id="" action="ppaction://media"/>
+          </p:cNvPr>
+          <p:cNvPicPr>
+            <a:picLocks noChangeAspect="1"/>
+          </p:cNvPicPr>
+          <p:nvPr>
+            <a:audioFile r:link="rId2"/>
+            <p:extLst>
+              <p:ext uri="{DAA4B4D4-6D71-4841-9C94-3DE7FCFB9230}">
+                <p14:media xmlns:p14="http://schemas.microsoft.com/office/powerpoint/2010/main" r:embed="rId1"/>
+              </p:ext>
+            </p:extLst>
+          </p:nvPr>
+        </p:nvPicPr>
+        <p:blipFill>
+          <a:blip r:embed="rId11"/>
+          <a:stretch>
+            <a:fillRect/>
+          </a:stretch>
+        </p:blipFill>
+        <p:spPr>
+          <a:xfrm>
+            <a:off x="9448800" y="4914900"/>
+            <a:ext cx="609600" cy="609600"/>
+          </a:xfrm>
+          <a:prstGeom prst="rect">
+            <a:avLst/>
+          </a:prstGeom>
+        </p:spPr>
+      </p:pic>
     </p:spTree>
     <p:extLst>
       <p:ext uri="{BB962C8B-B14F-4D97-AF65-F5344CB8AC3E}">
@@ -4679,12 +4854,186 @@
   <p:clrMapOvr>
     <a:masterClrMapping/>
   </p:clrMapOvr>
+  <mc:AlternateContent xmlns:mc="http://schemas.openxmlformats.org/markup-compatibility/2006">
+    <mc:Choice xmlns:p14="http://schemas.microsoft.com/office/powerpoint/2010/main" Requires="p14">
+      <p:transition p14:dur="250" advTm="7027"/>
+    </mc:Choice>
+    <mc:Fallback>
+      <p:transition advTm="7027"/>
+    </mc:Fallback>
+  </mc:AlternateContent>
+  <p:timing>
+    <p:tnLst>
+      <p:par>
+        <p:cTn id="1" dur="indefinite" restart="never" nodeType="tmRoot">
+          <p:childTnLst>
+            <p:seq concurrent="1" nextAc="seek">
+              <p:cTn id="2" dur="indefinite" nodeType="mainSeq">
+                <p:childTnLst>
+                  <p:par>
+                    <p:cTn id="3" fill="hold">
+                      <p:stCondLst>
+                        <p:cond delay="indefinite"/>
+                        <p:cond evt="onBegin" delay="0">
+                          <p:tn val="2"/>
+                        </p:cond>
+                      </p:stCondLst>
+                      <p:childTnLst>
+                        <p:par>
+                          <p:cTn id="4" fill="hold">
+                            <p:stCondLst>
+                              <p:cond delay="0"/>
+                            </p:stCondLst>
+                            <p:childTnLst>
+                              <p:par>
+                                <p:cTn id="5" presetID="1" presetClass="mediacall" presetSubtype="0" fill="hold" nodeType="afterEffect">
+                                  <p:stCondLst>
+                                    <p:cond delay="0"/>
+                                  </p:stCondLst>
+                                  <p:childTnLst>
+                                    <p:cmd type="call" cmd="playFrom(0.0)">
+                                      <p:cBhvr>
+                                        <p:cTn id="6" dur="1" fill="hold"/>
+                                        <p:tgtEl>
+                                          <p:spTgt spid="4"/>
+                                        </p:tgtEl>
+                                      </p:cBhvr>
+                                    </p:cmd>
+                                  </p:childTnLst>
+                                </p:cTn>
+                              </p:par>
+                            </p:childTnLst>
+                          </p:cTn>
+                        </p:par>
+                      </p:childTnLst>
+                    </p:cTn>
+                  </p:par>
+                </p:childTnLst>
+              </p:cTn>
+              <p:prevCondLst>
+                <p:cond evt="onPrev" delay="0">
+                  <p:tgtEl>
+                    <p:sldTgt/>
+                  </p:tgtEl>
+                </p:cond>
+              </p:prevCondLst>
+              <p:nextCondLst>
+                <p:cond evt="onNext" delay="0">
+                  <p:tgtEl>
+                    <p:sldTgt/>
+                  </p:tgtEl>
+                </p:cond>
+              </p:nextCondLst>
+            </p:seq>
+            <p:audio isNarration="1">
+              <p:cMediaNode vol="80000" showWhenStopped="0">
+                <p:cTn id="7" fill="hold" display="0">
+                  <p:stCondLst>
+                    <p:cond delay="indefinite"/>
+                  </p:stCondLst>
+                  <p:endCondLst>
+                    <p:cond evt="onStopAudio" delay="0">
+                      <p:tgtEl>
+                        <p:sldTgt/>
+                      </p:tgtEl>
+                    </p:cond>
+                  </p:endCondLst>
+                </p:cTn>
+                <p:tgtEl>
+                  <p:spTgt spid="4"/>
+                </p:tgtEl>
+              </p:cMediaNode>
+            </p:audio>
+          </p:childTnLst>
+        </p:cTn>
+      </p:par>
+    </p:tnLst>
+  </p:timing>
+</p:sld>
+</file>
+
+<file path=ppt/slides/slide10.xml><?xml version="1.0" encoding="utf-8"?>
+<p:sld xmlns:a="http://schemas.openxmlformats.org/drawingml/2006/main" xmlns:r="http://schemas.openxmlformats.org/officeDocument/2006/relationships" xmlns:p="http://schemas.openxmlformats.org/presentationml/2006/main">
+  <p:cSld>
+    <p:spTree>
+      <p:nvGrpSpPr>
+        <p:cNvPr id="1" name=""/>
+        <p:cNvGrpSpPr/>
+        <p:nvPr/>
+      </p:nvGrpSpPr>
+      <p:grpSpPr>
+        <a:xfrm>
+          <a:off x="0" y="0"/>
+          <a:ext cx="0" cy="0"/>
+          <a:chOff x="0" y="0"/>
+          <a:chExt cx="0" cy="0"/>
+        </a:xfrm>
+      </p:grpSpPr>
+      <p:sp>
+        <p:nvSpPr>
+          <p:cNvPr id="6" name="Title 1"/>
+          <p:cNvSpPr txBox="1">
+            <a:spLocks/>
+          </p:cNvSpPr>
+          <p:nvPr/>
+        </p:nvSpPr>
+        <p:spPr>
+          <a:xfrm>
+            <a:off x="3219504" y="168797"/>
+            <a:ext cx="2609796" cy="609600"/>
+          </a:xfrm>
+          <a:prstGeom prst="rect">
+            <a:avLst/>
+          </a:prstGeom>
+          <a:solidFill>
+            <a:schemeClr val="bg1"/>
+          </a:solidFill>
+        </p:spPr>
+        <p:txBody>
+          <a:bodyPr bIns="91440" anchor="b" anchorCtr="0">
+            <a:noAutofit/>
+          </a:bodyPr>
+          <a:lstStyle>
+            <a:lvl1pPr algn="l" rtl="0" eaLnBrk="1" latinLnBrk="0" hangingPunct="1">
+              <a:spcBef>
+                <a:spcPct val="0"/>
+              </a:spcBef>
+              <a:buNone/>
+              <a:defRPr kumimoji="0" sz="4000" kern="1200">
+                <a:solidFill>
+                  <a:schemeClr val="tx2"/>
+                </a:solidFill>
+                <a:latin typeface="+mj-lt"/>
+                <a:ea typeface="+mj-ea"/>
+                <a:cs typeface="+mj-cs"/>
+              </a:defRPr>
+            </a:lvl1pPr>
+          </a:lstStyle>
+          <a:p>
+            <a:r>
+              <a:rPr lang="en-US" sz="3600" dirty="0" smtClean="0"/>
+              <a:t>QA Testing</a:t>
+            </a:r>
+            <a:endParaRPr lang="en-US" sz="3200" dirty="0"/>
+          </a:p>
+        </p:txBody>
+      </p:sp>
+    </p:spTree>
+    <p:extLst>
+      <p:ext uri="{BB962C8B-B14F-4D97-AF65-F5344CB8AC3E}">
+        <p14:creationId xmlns:p14="http://schemas.microsoft.com/office/powerpoint/2010/main" val="4176045461"/>
+      </p:ext>
+    </p:extLst>
+  </p:cSld>
+  <p:clrMapOvr>
+    <a:masterClrMapping/>
+  </p:clrMapOvr>
   <mc:AlternateContent xmlns:mc="http://schemas.openxmlformats.org/markup-compatibility/2006" xmlns:p14="http://schemas.microsoft.com/office/powerpoint/2010/main">
     <mc:Choice Requires="p14">
-      <p:transition p14:dur="250" advTm="7363"/>
+      <p:transition spd="slow" p14:dur="2000" advTm="21610"/>
     </mc:Choice>
     <mc:Fallback xmlns="">
-      <p:transition advTm="7363"/>
+      <p:transition spd="slow" advTm="21610"/>
     </mc:Fallback>
   </mc:AlternateContent>
   <p:timing>
@@ -4694,10 +5043,18 @@
       </p:par>
     </p:tnLst>
   </p:timing>
+  <p:extLst mod="1">
+    <p:ext uri="{E180D4A7-C9FB-4DFB-919C-405C955672EB}">
+      <p14:showEvtLst xmlns:p14="http://schemas.microsoft.com/office/powerpoint/2010/main">
+        <p14:playEvt time="20" objId="2"/>
+        <p14:stopEvt time="13615" objId="2"/>
+      </p14:showEvtLst>
+    </p:ext>
+  </p:extLst>
 </p:sld>
 </file>
 
-<file path=ppt/slides/slide10.xml><?xml version="1.0" encoding="utf-8"?>
+<file path=ppt/slides/slide11.xml><?xml version="1.0" encoding="utf-8"?>
 <p:sld xmlns:a="http://schemas.openxmlformats.org/drawingml/2006/main" xmlns:r="http://schemas.openxmlformats.org/officeDocument/2006/relationships" xmlns:p="http://schemas.openxmlformats.org/presentationml/2006/main">
   <p:cSld>
     <p:spTree>
@@ -4856,7 +5213,7 @@
 </p:sld>
 </file>
 
-<file path=ppt/slides/slide11.xml><?xml version="1.0" encoding="utf-8"?>
+<file path=ppt/slides/slide12.xml><?xml version="1.0" encoding="utf-8"?>
 <p:sld xmlns:a="http://schemas.openxmlformats.org/drawingml/2006/main" xmlns:r="http://schemas.openxmlformats.org/officeDocument/2006/relationships" xmlns:p="http://schemas.openxmlformats.org/presentationml/2006/main">
   <p:cSld>
     <p:spTree>
@@ -4891,10 +5248,10 @@
           <a:lstStyle/>
           <a:p>
             <a:r>
-              <a:rPr lang="en-US" smtClean="0"/>
+              <a:rPr lang="en-US" sz="3600" dirty="0" smtClean="0"/>
               <a:t>Project Post-Mortem</a:t>
             </a:r>
-            <a:endParaRPr lang="en-US" dirty="0"/>
+            <a:endParaRPr lang="en-US" sz="3600" dirty="0"/>
           </a:p>
         </p:txBody>
       </p:sp>
@@ -4957,35 +5314,225 @@
             <p:ph type="title"/>
           </p:nvPr>
         </p:nvSpPr>
-        <p:spPr/>
-        <p:txBody>
-          <a:bodyPr/>
-          <a:lstStyle/>
-          <a:p>
-            <a:r>
-              <a:rPr lang="en-US" smtClean="0"/>
+        <p:spPr>
+          <a:xfrm>
+            <a:off x="161041" y="-195790"/>
+            <a:ext cx="7772400" cy="952500"/>
+          </a:xfrm>
+        </p:spPr>
+        <p:txBody>
+          <a:bodyPr>
+            <a:normAutofit/>
+          </a:bodyPr>
+          <a:lstStyle/>
+          <a:p>
+            <a:r>
+              <a:rPr lang="en-US" sz="3600" dirty="0" smtClean="0"/>
               <a:t>Executive Summary</a:t>
             </a:r>
-            <a:endParaRPr lang="en-US"/>
-          </a:p>
-        </p:txBody>
-      </p:sp>
-      <p:sp>
-        <p:nvSpPr>
-          <p:cNvPr id="3" name="Content Placeholder 2"/>
-          <p:cNvSpPr>
-            <a:spLocks noGrp="1"/>
-          </p:cNvSpPr>
-          <p:nvPr>
-            <p:ph sz="quarter" idx="1"/>
-          </p:nvPr>
-        </p:nvSpPr>
-        <p:spPr/>
-        <p:txBody>
-          <a:bodyPr/>
-          <a:lstStyle/>
-          <a:p>
-            <a:endParaRPr lang="en-US"/>
+            <a:endParaRPr lang="en-US" sz="3600" dirty="0"/>
+          </a:p>
+        </p:txBody>
+      </p:sp>
+      <p:pic>
+        <p:nvPicPr>
+          <p:cNvPr id="4" name="Audio 3">
+            <a:hlinkClick r:id="" action="ppaction://media"/>
+          </p:cNvPr>
+          <p:cNvPicPr>
+            <a:picLocks noChangeAspect="1"/>
+          </p:cNvPicPr>
+          <p:nvPr>
+            <a:audioFile r:link="rId1"/>
+            <p:extLst>
+              <p:ext uri="{DAA4B4D4-6D71-4841-9C94-3DE7FCFB9230}">
+                <p14:media xmlns:p14="http://schemas.microsoft.com/office/powerpoint/2010/main" r:embed="rId2">
+                  <p14:trim st="810"/>
+                </p14:media>
+              </p:ext>
+            </p:extLst>
+          </p:nvPr>
+        </p:nvPicPr>
+        <p:blipFill>
+          <a:blip r:embed="rId5"/>
+          <a:stretch>
+            <a:fillRect/>
+          </a:stretch>
+        </p:blipFill>
+        <p:spPr>
+          <a:xfrm>
+            <a:off x="9448800" y="4993326"/>
+            <a:ext cx="609600" cy="609600"/>
+          </a:xfrm>
+          <a:prstGeom prst="rect">
+            <a:avLst/>
+          </a:prstGeom>
+        </p:spPr>
+      </p:pic>
+      <p:pic>
+        <p:nvPicPr>
+          <p:cNvPr id="6" name="Picture 2"/>
+          <p:cNvPicPr>
+            <a:picLocks noChangeAspect="1" noChangeArrowheads="1"/>
+          </p:cNvPicPr>
+          <p:nvPr/>
+        </p:nvPicPr>
+        <p:blipFill rotWithShape="1">
+          <a:blip r:embed="rId6">
+            <a:extLst>
+              <a:ext uri="{28A0092B-C50C-407E-A947-70E740481C1C}">
+                <a14:useLocalDpi xmlns:a14="http://schemas.microsoft.com/office/drawing/2010/main" val="0"/>
+              </a:ext>
+            </a:extLst>
+          </a:blip>
+          <a:srcRect l="1988" t="24234" r="3893" b="1345"/>
+          <a:stretch/>
+        </p:blipFill>
+        <p:spPr bwMode="auto">
+          <a:xfrm>
+            <a:off x="152400" y="1310708"/>
+            <a:ext cx="4389120" cy="3931920"/>
+          </a:xfrm>
+          <a:prstGeom prst="rect">
+            <a:avLst/>
+          </a:prstGeom>
+          <a:noFill/>
+          <a:ln>
+            <a:noFill/>
+          </a:ln>
+          <a:extLst>
+            <a:ext uri="{909E8E84-426E-40DD-AFC4-6F175D3DCCD1}">
+              <a14:hiddenFill xmlns:a14="http://schemas.microsoft.com/office/drawing/2010/main">
+                <a:solidFill>
+                  <a:schemeClr val="accent1"/>
+                </a:solidFill>
+              </a14:hiddenFill>
+            </a:ext>
+            <a:ext uri="{91240B29-F687-4F45-9708-019B960494DF}">
+              <a14:hiddenLine xmlns:a14="http://schemas.microsoft.com/office/drawing/2010/main" w="9525">
+                <a:solidFill>
+                  <a:schemeClr val="tx1"/>
+                </a:solidFill>
+                <a:miter lim="800000"/>
+                <a:headEnd/>
+                <a:tailEnd/>
+              </a14:hiddenLine>
+            </a:ext>
+          </a:extLst>
+        </p:spPr>
+      </p:pic>
+      <p:pic>
+        <p:nvPicPr>
+          <p:cNvPr id="7" name="Picture 3"/>
+          <p:cNvPicPr>
+            <a:picLocks noChangeAspect="1" noChangeArrowheads="1"/>
+          </p:cNvPicPr>
+          <p:nvPr/>
+        </p:nvPicPr>
+        <p:blipFill rotWithShape="1">
+          <a:blip r:embed="rId7">
+            <a:extLst>
+              <a:ext uri="{28A0092B-C50C-407E-A947-70E740481C1C}">
+                <a14:useLocalDpi xmlns:a14="http://schemas.microsoft.com/office/drawing/2010/main" val="0"/>
+              </a:ext>
+            </a:extLst>
+          </a:blip>
+          <a:srcRect l="1943" t="1341" r="1864" b="2571"/>
+          <a:stretch/>
+        </p:blipFill>
+        <p:spPr bwMode="auto">
+          <a:xfrm>
+            <a:off x="4541520" y="1310708"/>
+            <a:ext cx="4526280" cy="3931920"/>
+          </a:xfrm>
+          <a:prstGeom prst="rect">
+            <a:avLst/>
+          </a:prstGeom>
+          <a:noFill/>
+          <a:ln>
+            <a:noFill/>
+          </a:ln>
+          <a:extLst>
+            <a:ext uri="{909E8E84-426E-40DD-AFC4-6F175D3DCCD1}">
+              <a14:hiddenFill xmlns:a14="http://schemas.microsoft.com/office/drawing/2010/main">
+                <a:solidFill>
+                  <a:schemeClr val="accent1"/>
+                </a:solidFill>
+              </a14:hiddenFill>
+            </a:ext>
+            <a:ext uri="{91240B29-F687-4F45-9708-019B960494DF}">
+              <a14:hiddenLine xmlns:a14="http://schemas.microsoft.com/office/drawing/2010/main" w="9525">
+                <a:solidFill>
+                  <a:schemeClr val="tx1"/>
+                </a:solidFill>
+                <a:miter lim="800000"/>
+                <a:headEnd/>
+                <a:tailEnd/>
+              </a14:hiddenLine>
+            </a:ext>
+          </a:extLst>
+        </p:spPr>
+      </p:pic>
+      <p:sp>
+        <p:nvSpPr>
+          <p:cNvPr id="8" name="TextBox 7"/>
+          <p:cNvSpPr txBox="1"/>
+          <p:nvPr/>
+        </p:nvSpPr>
+        <p:spPr>
+          <a:xfrm>
+            <a:off x="152400" y="5242628"/>
+            <a:ext cx="8561222" cy="369332"/>
+          </a:xfrm>
+          <a:prstGeom prst="rect">
+            <a:avLst/>
+          </a:prstGeom>
+          <a:noFill/>
+        </p:spPr>
+        <p:txBody>
+          <a:bodyPr wrap="square" rtlCol="0">
+            <a:spAutoFit/>
+          </a:bodyPr>
+          <a:lstStyle/>
+          <a:p>
+            <a:r>
+              <a:rPr lang="en-US" dirty="0"/>
+              <a:t>Source: https://www.bcbsal.org/providers/pdfs/riskAdjustment.pdf</a:t>
+            </a:r>
+          </a:p>
+        </p:txBody>
+      </p:sp>
+      <p:sp>
+        <p:nvSpPr>
+          <p:cNvPr id="12" name="TextBox 11"/>
+          <p:cNvSpPr txBox="1"/>
+          <p:nvPr/>
+        </p:nvSpPr>
+        <p:spPr>
+          <a:xfrm>
+            <a:off x="288079" y="756710"/>
+            <a:ext cx="8506881" cy="369332"/>
+          </a:xfrm>
+          <a:prstGeom prst="rect">
+            <a:avLst/>
+          </a:prstGeom>
+          <a:noFill/>
+        </p:spPr>
+        <p:txBody>
+          <a:bodyPr wrap="none" rtlCol="0">
+            <a:spAutoFit/>
+          </a:bodyPr>
+          <a:lstStyle/>
+          <a:p>
+            <a:pPr marL="285750" indent="-285750">
+              <a:buFont typeface="Arial" panose="020B0604020202020204" pitchFamily="34" charset="0"/>
+              <a:buChar char="•"/>
+            </a:pPr>
+            <a:r>
+              <a:rPr lang="en-US" dirty="0" smtClean="0"/>
+              <a:t>Under ACA Risk Adjustment, missing or inaccurate data leads to lower provider reimbursement.</a:t>
+            </a:r>
+            <a:endParaRPr lang="en-US" dirty="0"/>
           </a:p>
         </p:txBody>
       </p:sp>
@@ -4999,6 +5546,101 @@
   <p:clrMapOvr>
     <a:masterClrMapping/>
   </p:clrMapOvr>
+  <mc:AlternateContent xmlns:mc="http://schemas.openxmlformats.org/markup-compatibility/2006">
+    <mc:Choice xmlns:p14="http://schemas.microsoft.com/office/powerpoint/2010/main" Requires="p14">
+      <p:transition spd="slow" p14:dur="2000" advTm="56676"/>
+    </mc:Choice>
+    <mc:Fallback>
+      <p:transition spd="slow" advTm="56676"/>
+    </mc:Fallback>
+  </mc:AlternateContent>
+  <p:timing>
+    <p:tnLst>
+      <p:par>
+        <p:cTn id="1" dur="indefinite" restart="never" nodeType="tmRoot">
+          <p:childTnLst>
+            <p:seq concurrent="1" nextAc="seek">
+              <p:cTn id="2" dur="indefinite" nodeType="mainSeq">
+                <p:childTnLst>
+                  <p:par>
+                    <p:cTn id="3" fill="hold">
+                      <p:stCondLst>
+                        <p:cond delay="indefinite"/>
+                        <p:cond evt="onBegin" delay="0">
+                          <p:tn val="2"/>
+                        </p:cond>
+                      </p:stCondLst>
+                      <p:childTnLst>
+                        <p:par>
+                          <p:cTn id="4" fill="hold">
+                            <p:stCondLst>
+                              <p:cond delay="0"/>
+                            </p:stCondLst>
+                            <p:childTnLst>
+                              <p:par>
+                                <p:cTn id="5" presetID="1" presetClass="mediacall" presetSubtype="0" fill="hold" nodeType="afterEffect">
+                                  <p:stCondLst>
+                                    <p:cond delay="0"/>
+                                  </p:stCondLst>
+                                  <p:childTnLst>
+                                    <p:cmd type="call" cmd="playFrom(0.0)">
+                                      <p:cBhvr>
+                                        <p:cTn id="6" dur="1" fill="hold"/>
+                                        <p:tgtEl>
+                                          <p:spTgt spid="4"/>
+                                        </p:tgtEl>
+                                      </p:cBhvr>
+                                    </p:cmd>
+                                  </p:childTnLst>
+                                </p:cTn>
+                              </p:par>
+                            </p:childTnLst>
+                          </p:cTn>
+                        </p:par>
+                      </p:childTnLst>
+                    </p:cTn>
+                  </p:par>
+                </p:childTnLst>
+              </p:cTn>
+              <p:prevCondLst>
+                <p:cond evt="onPrev" delay="0">
+                  <p:tgtEl>
+                    <p:sldTgt/>
+                  </p:tgtEl>
+                </p:cond>
+              </p:prevCondLst>
+              <p:nextCondLst>
+                <p:cond evt="onNext" delay="0">
+                  <p:tgtEl>
+                    <p:sldTgt/>
+                  </p:tgtEl>
+                </p:cond>
+              </p:nextCondLst>
+            </p:seq>
+            <p:audio isNarration="1">
+              <p:cMediaNode vol="80000" showWhenStopped="0">
+                <p:cTn id="7" fill="hold" display="0">
+                  <p:stCondLst>
+                    <p:cond delay="indefinite"/>
+                  </p:stCondLst>
+                  <p:endCondLst>
+                    <p:cond evt="onStopAudio" delay="0">
+                      <p:tgtEl>
+                        <p:sldTgt/>
+                      </p:tgtEl>
+                    </p:cond>
+                  </p:endCondLst>
+                </p:cTn>
+                <p:tgtEl>
+                  <p:spTgt spid="4"/>
+                </p:tgtEl>
+              </p:cMediaNode>
+            </p:audio>
+          </p:childTnLst>
+        </p:cTn>
+      </p:par>
+    </p:tnLst>
+  </p:timing>
 </p:sld>
 </file>
 
@@ -5021,75 +5663,123 @@
       </p:grpSpPr>
       <p:sp>
         <p:nvSpPr>
-          <p:cNvPr id="8" name="Title 1"/>
-          <p:cNvSpPr txBox="1">
-            <a:spLocks/>
-          </p:cNvSpPr>
-          <p:nvPr/>
+          <p:cNvPr id="2" name="Title 1"/>
+          <p:cNvSpPr>
+            <a:spLocks noGrp="1"/>
+          </p:cNvSpPr>
+          <p:nvPr>
+            <p:ph type="title"/>
+          </p:nvPr>
         </p:nvSpPr>
         <p:spPr>
           <a:xfrm>
-            <a:off x="762000" y="190500"/>
-            <a:ext cx="8153400" cy="609600"/>
+            <a:off x="914400" y="228866"/>
+            <a:ext cx="7772400" cy="571234"/>
           </a:xfrm>
-          <a:prstGeom prst="rect">
-            <a:avLst/>
-          </a:prstGeom>
-          <a:solidFill>
-            <a:schemeClr val="bg1"/>
-          </a:solidFill>
         </p:spPr>
         <p:txBody>
-          <a:bodyPr bIns="91440" anchor="b" anchorCtr="0">
+          <a:bodyPr>
             <a:noAutofit/>
           </a:bodyPr>
-          <a:lstStyle>
-            <a:lvl1pPr algn="l" rtl="0" eaLnBrk="1" latinLnBrk="0" hangingPunct="1">
-              <a:spcBef>
-                <a:spcPct val="0"/>
-              </a:spcBef>
-              <a:buNone/>
-              <a:defRPr kumimoji="0" sz="4000" kern="1200">
-                <a:solidFill>
-                  <a:schemeClr val="tx2"/>
-                </a:solidFill>
-                <a:latin typeface="+mj-lt"/>
-                <a:ea typeface="+mj-ea"/>
-                <a:cs typeface="+mj-cs"/>
-              </a:defRPr>
-            </a:lvl1pPr>
-          </a:lstStyle>
-          <a:p>
-            <a:r>
-              <a:rPr lang="en-US" sz="3600" dirty="0" smtClean="0"/>
-              <a:t>Updated</a:t>
-            </a:r>
-            <a:r>
-              <a:rPr lang="en-US" sz="3200" dirty="0" smtClean="0"/>
-              <a:t> Gantt Chart</a:t>
-            </a:r>
-            <a:endParaRPr lang="en-US" sz="3200" dirty="0"/>
+          <a:lstStyle/>
+          <a:p>
+            <a:r>
+              <a:rPr lang="en-US" sz="3600" dirty="0"/>
+              <a:t>Team Member Key Responsibilities</a:t>
+            </a:r>
+          </a:p>
+        </p:txBody>
+      </p:sp>
+      <p:sp>
+        <p:nvSpPr>
+          <p:cNvPr id="3" name="Content Placeholder 2"/>
+          <p:cNvSpPr>
+            <a:spLocks noGrp="1"/>
+          </p:cNvSpPr>
+          <p:nvPr>
+            <p:ph sz="quarter" idx="1"/>
+          </p:nvPr>
+        </p:nvSpPr>
+        <p:spPr/>
+        <p:txBody>
+          <a:bodyPr/>
+          <a:lstStyle/>
+          <a:p>
+            <a:r>
+              <a:rPr lang="en-US" sz="2400" dirty="0"/>
+              <a:t>Augusto Burgos – Co-Lead Developer</a:t>
+            </a:r>
+          </a:p>
+          <a:p>
+            <a:r>
+              <a:rPr lang="en-US" sz="2400" dirty="0"/>
+              <a:t>Spiro Ganas – Project Sponsor / Developer</a:t>
+            </a:r>
+          </a:p>
+          <a:p>
+            <a:r>
+              <a:rPr lang="en-US" sz="2400" dirty="0" err="1"/>
+              <a:t>Anja</a:t>
+            </a:r>
+            <a:r>
+              <a:rPr lang="en-US" sz="2400" dirty="0"/>
+              <a:t> Guillory – Co-Lead Developer</a:t>
+            </a:r>
+          </a:p>
+          <a:p>
+            <a:r>
+              <a:rPr lang="en-US" sz="2400" dirty="0"/>
+              <a:t>Jamie </a:t>
+            </a:r>
+            <a:r>
+              <a:rPr lang="en-US" sz="2400" dirty="0" err="1"/>
+              <a:t>Richgels</a:t>
+            </a:r>
+            <a:r>
+              <a:rPr lang="en-US" sz="2400" dirty="0"/>
+              <a:t> – UI testing and Business Analyst</a:t>
+            </a:r>
+          </a:p>
+          <a:p>
+            <a:r>
+              <a:rPr lang="en-US" sz="2400" dirty="0"/>
+              <a:t>Daniel </a:t>
+            </a:r>
+            <a:r>
+              <a:rPr lang="en-US" sz="2400" dirty="0" err="1"/>
+              <a:t>Stoneburner</a:t>
+            </a:r>
+            <a:r>
+              <a:rPr lang="en-US" sz="2400" dirty="0"/>
+              <a:t> – Code testing</a:t>
+            </a:r>
+          </a:p>
+          <a:p>
+            <a:r>
+              <a:rPr lang="en-US" sz="2400" dirty="0"/>
+              <a:t>Tala </a:t>
+            </a:r>
+            <a:r>
+              <a:rPr lang="en-US" sz="2400" dirty="0" err="1"/>
+              <a:t>Suidan</a:t>
+            </a:r>
+            <a:r>
+              <a:rPr lang="en-US" sz="2400" dirty="0"/>
+              <a:t> – Project Manager / Business Analyst</a:t>
+            </a:r>
           </a:p>
         </p:txBody>
       </p:sp>
     </p:spTree>
     <p:extLst>
       <p:ext uri="{BB962C8B-B14F-4D97-AF65-F5344CB8AC3E}">
-        <p14:creationId xmlns:p14="http://schemas.microsoft.com/office/powerpoint/2010/main" val="1153010175"/>
+        <p14:creationId xmlns:p14="http://schemas.microsoft.com/office/powerpoint/2010/main" val="2366413252"/>
       </p:ext>
     </p:extLst>
   </p:cSld>
   <p:clrMapOvr>
     <a:masterClrMapping/>
   </p:clrMapOvr>
-  <mc:AlternateContent xmlns:mc="http://schemas.openxmlformats.org/markup-compatibility/2006" xmlns:p14="http://schemas.microsoft.com/office/powerpoint/2010/main">
-    <mc:Choice Requires="p14">
-      <p:transition p14:dur="250" advTm="18727"/>
-    </mc:Choice>
-    <mc:Fallback xmlns="">
-      <p:transition advTm="18727"/>
-    </mc:Fallback>
-  </mc:AlternateContent>
   <p:timing>
     <p:tnLst>
       <p:par>
@@ -5127,8 +5817,8 @@
         </p:nvSpPr>
         <p:spPr>
           <a:xfrm>
-            <a:off x="762000" y="190500"/>
-            <a:ext cx="8153400" cy="457200"/>
+            <a:off x="609600" y="190500"/>
+            <a:ext cx="8153400" cy="609600"/>
           </a:xfrm>
           <a:prstGeom prst="rect">
             <a:avLst/>
@@ -5159,33 +5849,29 @@
           </a:lstStyle>
           <a:p>
             <a:r>
-              <a:rPr lang="en-US" sz="2800" dirty="0" smtClean="0"/>
-              <a:t>Updated</a:t>
-            </a:r>
-            <a:r>
-              <a:rPr lang="en-US" sz="2400" dirty="0" smtClean="0"/>
-              <a:t> RADV Architecture</a:t>
-            </a:r>
-            <a:endParaRPr lang="en-US" sz="2400" dirty="0"/>
+              <a:rPr lang="en-US" sz="3600" dirty="0" smtClean="0"/>
+              <a:t>Updated Gantt Chart</a:t>
+            </a:r>
+            <a:endParaRPr lang="en-US" sz="3600" dirty="0"/>
           </a:p>
         </p:txBody>
       </p:sp>
     </p:spTree>
     <p:extLst>
       <p:ext uri="{BB962C8B-B14F-4D97-AF65-F5344CB8AC3E}">
-        <p14:creationId xmlns:p14="http://schemas.microsoft.com/office/powerpoint/2010/main" val="3227512247"/>
+        <p14:creationId xmlns:p14="http://schemas.microsoft.com/office/powerpoint/2010/main" val="1153010175"/>
       </p:ext>
     </p:extLst>
   </p:cSld>
   <p:clrMapOvr>
     <a:masterClrMapping/>
   </p:clrMapOvr>
-  <mc:AlternateContent xmlns:mc="http://schemas.openxmlformats.org/markup-compatibility/2006" xmlns:p14="http://schemas.microsoft.com/office/powerpoint/2010/main">
-    <mc:Choice Requires="p14">
-      <p:transition p14:dur="250" advTm="32958"/>
+  <mc:AlternateContent xmlns:mc="http://schemas.openxmlformats.org/markup-compatibility/2006">
+    <mc:Choice xmlns:p14="http://schemas.microsoft.com/office/powerpoint/2010/main" Requires="p14">
+      <p:transition p14:dur="250" advTm="1894"/>
     </mc:Choice>
-    <mc:Fallback xmlns="">
-      <p:transition advTm="32958"/>
+    <mc:Fallback>
+      <p:transition advTm="1894"/>
     </mc:Fallback>
   </mc:AlternateContent>
   <p:timing>
@@ -5217,46 +5903,57 @@
       </p:grpSpPr>
       <p:sp>
         <p:nvSpPr>
-          <p:cNvPr id="2" name="Title 1"/>
-          <p:cNvSpPr>
-            <a:spLocks noGrp="1"/>
-          </p:cNvSpPr>
-          <p:nvPr>
-            <p:ph type="title"/>
-          </p:nvPr>
+          <p:cNvPr id="8" name="Title 1"/>
+          <p:cNvSpPr txBox="1">
+            <a:spLocks/>
+          </p:cNvSpPr>
+          <p:nvPr/>
         </p:nvSpPr>
         <p:spPr>
           <a:xfrm>
-            <a:off x="1905000" y="723900"/>
-            <a:ext cx="5334000" cy="2590800"/>
+            <a:off x="381000" y="266700"/>
+            <a:ext cx="8153400" cy="457200"/>
           </a:xfrm>
+          <a:prstGeom prst="rect">
+            <a:avLst/>
+          </a:prstGeom>
+          <a:solidFill>
+            <a:schemeClr val="bg1"/>
+          </a:solidFill>
         </p:spPr>
         <p:txBody>
-          <a:bodyPr>
-            <a:normAutofit fontScale="90000"/>
+          <a:bodyPr bIns="91440" anchor="b" anchorCtr="0">
+            <a:noAutofit/>
           </a:bodyPr>
-          <a:lstStyle/>
-          <a:p>
-            <a:pPr algn="ctr"/>
-            <a:r>
-              <a:rPr lang="en-US" sz="5400" dirty="0" smtClean="0"/>
-              <a:t>RADV Application </a:t>
-            </a:r>
-            <a:br>
-              <a:rPr lang="en-US" sz="5400" dirty="0" smtClean="0"/>
-            </a:br>
-            <a:r>
-              <a:rPr lang="en-US" sz="5400" dirty="0" smtClean="0"/>
-              <a:t>Walk-Through</a:t>
-            </a:r>
-            <a:endParaRPr lang="en-US" sz="5400" dirty="0"/>
+          <a:lstStyle>
+            <a:lvl1pPr algn="l" rtl="0" eaLnBrk="1" latinLnBrk="0" hangingPunct="1">
+              <a:spcBef>
+                <a:spcPct val="0"/>
+              </a:spcBef>
+              <a:buNone/>
+              <a:defRPr kumimoji="0" sz="4000" kern="1200">
+                <a:solidFill>
+                  <a:schemeClr val="tx2"/>
+                </a:solidFill>
+                <a:latin typeface="+mj-lt"/>
+                <a:ea typeface="+mj-ea"/>
+                <a:cs typeface="+mj-cs"/>
+              </a:defRPr>
+            </a:lvl1pPr>
+          </a:lstStyle>
+          <a:p>
+            <a:r>
+              <a:rPr lang="en-US" sz="3600" dirty="0" smtClean="0"/>
+              <a:t>Updated RADV Architecture</a:t>
+            </a:r>
+            <a:endParaRPr lang="en-US" sz="3600" dirty="0"/>
           </a:p>
         </p:txBody>
       </p:sp>
     </p:spTree>
     <p:extLst>
       <p:ext uri="{BB962C8B-B14F-4D97-AF65-F5344CB8AC3E}">
-        <p14:creationId xmlns:p14="http://schemas.microsoft.com/office/powerpoint/2010/main" val="3416693004"/>
+        <p14:creationId xmlns:p14="http://schemas.microsoft.com/office/powerpoint/2010/main" val="3227512247"/>
       </p:ext>
     </p:extLst>
   </p:cSld>
@@ -5265,10 +5962,10 @@
   </p:clrMapOvr>
   <mc:AlternateContent xmlns:mc="http://schemas.openxmlformats.org/markup-compatibility/2006" xmlns:p14="http://schemas.microsoft.com/office/powerpoint/2010/main">
     <mc:Choice Requires="p14">
-      <p:transition spd="slow" p14:dur="2000" advTm="2000"/>
+      <p:transition p14:dur="250" advTm="32958"/>
     </mc:Choice>
     <mc:Fallback xmlns="">
-      <p:transition spd="slow" advTm="2000"/>
+      <p:transition advTm="32958"/>
     </mc:Fallback>
   </mc:AlternateContent>
   <p:timing>
@@ -5308,44 +6005,59 @@
             <p:ph type="title"/>
           </p:nvPr>
         </p:nvSpPr>
-        <p:spPr/>
-        <p:txBody>
-          <a:bodyPr/>
-          <a:lstStyle/>
-          <a:p>
-            <a:endParaRPr lang="en-US"/>
-          </a:p>
-        </p:txBody>
-      </p:sp>
-      <p:sp>
-        <p:nvSpPr>
-          <p:cNvPr id="3" name="Content Placeholder 2"/>
-          <p:cNvSpPr>
-            <a:spLocks noGrp="1"/>
-          </p:cNvSpPr>
-          <p:nvPr>
-            <p:ph sz="quarter" idx="1"/>
-          </p:nvPr>
-        </p:nvSpPr>
-        <p:spPr/>
-        <p:txBody>
-          <a:bodyPr/>
-          <a:lstStyle/>
-          <a:p>
-            <a:endParaRPr lang="en-US"/>
+        <p:spPr>
+          <a:xfrm>
+            <a:off x="1905000" y="723900"/>
+            <a:ext cx="5334000" cy="2590800"/>
+          </a:xfrm>
+        </p:spPr>
+        <p:txBody>
+          <a:bodyPr>
+            <a:normAutofit/>
+          </a:bodyPr>
+          <a:lstStyle/>
+          <a:p>
+            <a:pPr algn="ctr"/>
+            <a:r>
+              <a:rPr lang="en-US" sz="5400" dirty="0" smtClean="0"/>
+              <a:t>RADV Application </a:t>
+            </a:r>
+            <a:br>
+              <a:rPr lang="en-US" sz="5400" dirty="0" smtClean="0"/>
+            </a:br>
+            <a:r>
+              <a:rPr lang="en-US" sz="5400" dirty="0" smtClean="0"/>
+              <a:t>Walk-Through</a:t>
+            </a:r>
+            <a:endParaRPr lang="en-US" sz="5400" dirty="0"/>
           </a:p>
         </p:txBody>
       </p:sp>
     </p:spTree>
     <p:extLst>
       <p:ext uri="{BB962C8B-B14F-4D97-AF65-F5344CB8AC3E}">
-        <p14:creationId xmlns:p14="http://schemas.microsoft.com/office/powerpoint/2010/main" val="1370577356"/>
+        <p14:creationId xmlns:p14="http://schemas.microsoft.com/office/powerpoint/2010/main" val="3416693004"/>
       </p:ext>
     </p:extLst>
   </p:cSld>
   <p:clrMapOvr>
     <a:masterClrMapping/>
   </p:clrMapOvr>
+  <mc:AlternateContent xmlns:mc="http://schemas.openxmlformats.org/markup-compatibility/2006" xmlns:p14="http://schemas.microsoft.com/office/powerpoint/2010/main">
+    <mc:Choice Requires="p14">
+      <p:transition spd="slow" p14:dur="2000" advTm="2000"/>
+    </mc:Choice>
+    <mc:Fallback xmlns="">
+      <p:transition spd="slow" advTm="2000"/>
+    </mc:Fallback>
+  </mc:AlternateContent>
+  <p:timing>
+    <p:tnLst>
+      <p:par>
+        <p:cTn id="1" dur="indefinite" restart="never" nodeType="tmRoot"/>
+      </p:par>
+    </p:tnLst>
+  </p:timing>
 </p:sld>
 </file>
 
@@ -5407,7 +6119,7 @@
     </p:spTree>
     <p:extLst>
       <p:ext uri="{BB962C8B-B14F-4D97-AF65-F5344CB8AC3E}">
-        <p14:creationId xmlns:p14="http://schemas.microsoft.com/office/powerpoint/2010/main" val="2771929681"/>
+        <p14:creationId xmlns:p14="http://schemas.microsoft.com/office/powerpoint/2010/main" val="1370577356"/>
       </p:ext>
     </p:extLst>
   </p:cSld>
@@ -5504,86 +6216,52 @@
       </p:grpSpPr>
       <p:sp>
         <p:nvSpPr>
-          <p:cNvPr id="6" name="Title 1"/>
-          <p:cNvSpPr txBox="1">
-            <a:spLocks/>
-          </p:cNvSpPr>
-          <p:nvPr/>
-        </p:nvSpPr>
-        <p:spPr>
-          <a:xfrm>
-            <a:off x="3219504" y="168797"/>
-            <a:ext cx="2609796" cy="609600"/>
-          </a:xfrm>
-          <a:prstGeom prst="rect">
-            <a:avLst/>
-          </a:prstGeom>
-          <a:solidFill>
-            <a:schemeClr val="bg1"/>
-          </a:solidFill>
-        </p:spPr>
-        <p:txBody>
-          <a:bodyPr bIns="91440" anchor="b" anchorCtr="0">
-            <a:noAutofit/>
-          </a:bodyPr>
-          <a:lstStyle>
-            <a:lvl1pPr algn="l" rtl="0" eaLnBrk="1" latinLnBrk="0" hangingPunct="1">
-              <a:spcBef>
-                <a:spcPct val="0"/>
-              </a:spcBef>
-              <a:buNone/>
-              <a:defRPr kumimoji="0" sz="4000" kern="1200">
-                <a:solidFill>
-                  <a:schemeClr val="tx2"/>
-                </a:solidFill>
-                <a:latin typeface="+mj-lt"/>
-                <a:ea typeface="+mj-ea"/>
-                <a:cs typeface="+mj-cs"/>
-              </a:defRPr>
-            </a:lvl1pPr>
-          </a:lstStyle>
-          <a:p>
-            <a:r>
-              <a:rPr lang="en-US" sz="3600" dirty="0" smtClean="0"/>
-              <a:t>QA Testing</a:t>
-            </a:r>
-            <a:endParaRPr lang="en-US" sz="3200" dirty="0"/>
+          <p:cNvPr id="2" name="Title 1"/>
+          <p:cNvSpPr>
+            <a:spLocks noGrp="1"/>
+          </p:cNvSpPr>
+          <p:nvPr>
+            <p:ph type="title"/>
+          </p:nvPr>
+        </p:nvSpPr>
+        <p:spPr/>
+        <p:txBody>
+          <a:bodyPr/>
+          <a:lstStyle/>
+          <a:p>
+            <a:endParaRPr lang="en-US"/>
+          </a:p>
+        </p:txBody>
+      </p:sp>
+      <p:sp>
+        <p:nvSpPr>
+          <p:cNvPr id="3" name="Content Placeholder 2"/>
+          <p:cNvSpPr>
+            <a:spLocks noGrp="1"/>
+          </p:cNvSpPr>
+          <p:nvPr>
+            <p:ph sz="quarter" idx="1"/>
+          </p:nvPr>
+        </p:nvSpPr>
+        <p:spPr/>
+        <p:txBody>
+          <a:bodyPr/>
+          <a:lstStyle/>
+          <a:p>
+            <a:endParaRPr lang="en-US"/>
           </a:p>
         </p:txBody>
       </p:sp>
     </p:spTree>
     <p:extLst>
       <p:ext uri="{BB962C8B-B14F-4D97-AF65-F5344CB8AC3E}">
-        <p14:creationId xmlns:p14="http://schemas.microsoft.com/office/powerpoint/2010/main" val="4176045461"/>
+        <p14:creationId xmlns:p14="http://schemas.microsoft.com/office/powerpoint/2010/main" val="2771929681"/>
       </p:ext>
     </p:extLst>
   </p:cSld>
   <p:clrMapOvr>
     <a:masterClrMapping/>
   </p:clrMapOvr>
-  <mc:AlternateContent xmlns:mc="http://schemas.openxmlformats.org/markup-compatibility/2006" xmlns:p14="http://schemas.microsoft.com/office/powerpoint/2010/main">
-    <mc:Choice Requires="p14">
-      <p:transition spd="slow" p14:dur="2000" advTm="21610"/>
-    </mc:Choice>
-    <mc:Fallback xmlns="">
-      <p:transition spd="slow" advTm="21610"/>
-    </mc:Fallback>
-  </mc:AlternateContent>
-  <p:timing>
-    <p:tnLst>
-      <p:par>
-        <p:cTn id="1" dur="indefinite" restart="never" nodeType="tmRoot"/>
-      </p:par>
-    </p:tnLst>
-  </p:timing>
-  <p:extLst mod="1">
-    <p:ext uri="{E180D4A7-C9FB-4DFB-919C-405C955672EB}">
-      <p14:showEvtLst xmlns:p14="http://schemas.microsoft.com/office/powerpoint/2010/main">
-        <p14:playEvt time="20" objId="2"/>
-        <p14:stopEvt time="13615" objId="2"/>
-      </p14:showEvtLst>
-    </p:ext>
-  </p:extLst>
 </p:sld>
 </file>
 
@@ -6114,7 +6792,7 @@
   <a:extraClrSchemeLst/>
   <a:extLst>
     <a:ext uri="{05A4C25C-085E-4340-85A3-A5531E510DB2}">
-      <thm15:themeFamily xmlns="" xmlns:thm15="http://schemas.microsoft.com/office/thememl/2012/main" name="Office Theme" id="{62F939B6-93AF-4DB8-9C6B-D6C7DFDC589F}" vid="{4A3C46E8-61CC-4603-A589-7422A47A8E4A}"/>
+      <thm15:themeFamily xmlns:thm15="http://schemas.microsoft.com/office/thememl/2012/main" name="Office Theme" id="{62F939B6-93AF-4DB8-9C6B-D6C7DFDC589F}" vid="{4A3C46E8-61CC-4603-A589-7422A47A8E4A}"/>
     </a:ext>
   </a:extLst>
 </a:theme>

</xml_diff>